<commit_message>
Polished documentation and presentation materials: British English conversion, author info added, file renames, PowerPoint regenerated. All references updated for consistency.
</commit_message>
<xml_diff>
--- a/App_Modernisation_Business_Slides.pptx
+++ b/App_Modernisation_Business_Slides.pptx
@@ -6055,14 +6055,15 @@
               <a:rPr b="1"/>
               <a:t>Mezba Rahman</a:t>
             </a:r>
+            <a:br/>
             <a:r>
               <a:rPr/>
-              <a:t> - mezba.rahman@capgemini.com</a:t>
+              <a:t>Platform Engineer | CIS Capgemini</a:t>
             </a:r>
             <a:br/>
             <a:r>
-              <a:rPr b="1"/>
-              <a:t>Platform Engineering, CIS Capgemini</a:t>
+              <a:rPr/>
+              <a:t>📧 mezba.rahman@capgemini.com</a:t>
             </a:r>
           </a:p>
           <a:p>
@@ -6074,6 +6075,73 @@
             </a:pPr>
             <a:r>
               <a:rPr b="1"/>
+              <a:t>Connect &amp; Follow</a:t>
+            </a:r>
+          </a:p>
+          <a:p>
+            <a:pPr lvl="0" indent="0" marL="0">
+              <a:buNone/>
+            </a:pPr>
+            <a:r>
+              <a:rPr/>
+              <a:t>🔗 </a:t>
+            </a:r>
+            <a:r>
+              <a:rPr b="1"/>
+              <a:t>LinkedIn:</a:t>
+            </a:r>
+            <a:r>
+              <a:rPr/>
+              <a:t> </a:t>
+            </a:r>
+            <a:r>
+              <a:rPr>
+                <a:hlinkClick r:id="rId2"/>
+              </a:rPr>
+              <a:t>linkedin.com/in/mezba</a:t>
+            </a:r>
+            <a:br/>
+            <a:r>
+              <a:rPr/>
+              <a:t>📝 </a:t>
+            </a:r>
+            <a:r>
+              <a:rPr b="1"/>
+              <a:t>Technical Blog:</a:t>
+            </a:r>
+            <a:r>
+              <a:rPr/>
+              <a:t> </a:t>
+            </a:r>
+            <a:r>
+              <a:rPr>
+                <a:hlinkClick r:id="rId3"/>
+              </a:rPr>
+              <a:t>medium.com/@mezba</a:t>
+            </a:r>
+            <a:br/>
+            <a:r>
+              <a:rPr/>
+              <a:t>💼 </a:t>
+            </a:r>
+            <a:r>
+              <a:rPr b="1"/>
+              <a:t>Expertise:</a:t>
+            </a:r>
+            <a:r>
+              <a:rPr/>
+              <a:t> Platform Engineering, App Modernisation, Cloud-Native Architecture</a:t>
+            </a:r>
+          </a:p>
+          <a:p>
+            <a:pPr lvl="0" indent="0" marL="0">
+              <a:spcBef>
+                <a:spcPts val="3000"/>
+              </a:spcBef>
+              <a:buNone/>
+            </a:pPr>
+            <a:r>
+              <a:rPr b="1"/>
               <a:t>Resources</a:t>
             </a:r>
           </a:p>
@@ -6092,7 +6160,7 @@
             <a:br/>
             <a:r>
               <a:rPr b="1"/>
-              <a:t>Modernization Guides</a:t>
+              <a:t>Modernisation Guides</a:t>
             </a:r>
             <a:r>
               <a:rPr/>
@@ -6119,7 +6187,7 @@
           <p:nvPr/>
         </p:nvPicPr>
         <p:blipFill>
-          <a:blip r:embed="rId2"/>
+          <a:blip r:embed="rId4"/>
           <a:stretch>
             <a:fillRect/>
           </a:stretch>

</xml_diff>